<commit_message>
Updated presentation deck with LZ's photo
</commit_message>
<xml_diff>
--- a/Presentation Deck/CE291 Final Product Presentation.pptx
+++ b/Presentation Deck/CE291 Final Product Presentation.pptx
@@ -189,8 +189,7 @@
 <file path=ppt/revisionInfo.xml><?xml version="1.0" encoding="utf-8"?>
 <p1510:revInfo xmlns:a="http://schemas.openxmlformats.org/drawingml/2006/main" xmlns:r="http://schemas.openxmlformats.org/officeDocument/2006/relationships" xmlns:p1510="http://schemas.microsoft.com/office/powerpoint/2015/10/main">
   <p1510:revLst>
-    <p1510:client id="{571BB704-6A36-4B47-A8AE-1C19CDB5B8A9}" v="1311" dt="2022-08-05T13:13:49.594"/>
-    <p1510:client id="{F562EA59-9AAF-445E-BD87-216468704C01}" v="1126" dt="2022-08-06T12:25:47.207"/>
+    <p1510:client id="{78B52672-DDA6-47E7-ABA0-663B0511BE6F}" v="71" dt="2022-08-08T09:20:54.800"/>
   </p1510:revLst>
 </p1510:revInfo>
 </file>
@@ -1177,6 +1176,60 @@
       </pc:sldChg>
     </pc:docChg>
   </pc:docChgLst>
+  <pc:docChgLst>
+    <pc:chgData name="Nicholas Pwi" userId="dce1f3ae2e513536" providerId="LiveId" clId="{78B52672-DDA6-47E7-ABA0-663B0511BE6F}"/>
+    <pc:docChg chg="modSld">
+      <pc:chgData name="Nicholas Pwi" userId="dce1f3ae2e513536" providerId="LiveId" clId="{78B52672-DDA6-47E7-ABA0-663B0511BE6F}" dt="2022-08-08T09:20:54.800" v="69" actId="20577"/>
+      <pc:docMkLst>
+        <pc:docMk/>
+      </pc:docMkLst>
+      <pc:sldChg chg="modSp">
+        <pc:chgData name="Nicholas Pwi" userId="dce1f3ae2e513536" providerId="LiveId" clId="{78B52672-DDA6-47E7-ABA0-663B0511BE6F}" dt="2022-08-08T08:11:04.052" v="4"/>
+        <pc:sldMkLst>
+          <pc:docMk/>
+          <pc:sldMk cId="2286308943" sldId="260"/>
+        </pc:sldMkLst>
+        <pc:graphicFrameChg chg="mod">
+          <ac:chgData name="Nicholas Pwi" userId="dce1f3ae2e513536" providerId="LiveId" clId="{78B52672-DDA6-47E7-ABA0-663B0511BE6F}" dt="2022-08-08T08:11:04.052" v="4"/>
+          <ac:graphicFrameMkLst>
+            <pc:docMk/>
+            <pc:sldMk cId="2286308943" sldId="260"/>
+            <ac:graphicFrameMk id="8" creationId="{E0C92FB6-724B-FA5F-649E-1996FDAC6CB5}"/>
+          </ac:graphicFrameMkLst>
+        </pc:graphicFrameChg>
+      </pc:sldChg>
+      <pc:sldChg chg="modSp">
+        <pc:chgData name="Nicholas Pwi" userId="dce1f3ae2e513536" providerId="LiveId" clId="{78B52672-DDA6-47E7-ABA0-663B0511BE6F}" dt="2022-08-08T08:12:16.319" v="10" actId="20577"/>
+        <pc:sldMkLst>
+          <pc:docMk/>
+          <pc:sldMk cId="1421929228" sldId="267"/>
+        </pc:sldMkLst>
+        <pc:graphicFrameChg chg="mod">
+          <ac:chgData name="Nicholas Pwi" userId="dce1f3ae2e513536" providerId="LiveId" clId="{78B52672-DDA6-47E7-ABA0-663B0511BE6F}" dt="2022-08-08T08:12:16.319" v="10" actId="20577"/>
+          <ac:graphicFrameMkLst>
+            <pc:docMk/>
+            <pc:sldMk cId="1421929228" sldId="267"/>
+            <ac:graphicFrameMk id="9" creationId="{7277E06C-3226-B1B3-8B6E-EBEE6A68B179}"/>
+          </ac:graphicFrameMkLst>
+        </pc:graphicFrameChg>
+      </pc:sldChg>
+      <pc:sldChg chg="modSp">
+        <pc:chgData name="Nicholas Pwi" userId="dce1f3ae2e513536" providerId="LiveId" clId="{78B52672-DDA6-47E7-ABA0-663B0511BE6F}" dt="2022-08-08T09:20:54.800" v="69" actId="20577"/>
+        <pc:sldMkLst>
+          <pc:docMk/>
+          <pc:sldMk cId="2478424578" sldId="269"/>
+        </pc:sldMkLst>
+        <pc:spChg chg="mod">
+          <ac:chgData name="Nicholas Pwi" userId="dce1f3ae2e513536" providerId="LiveId" clId="{78B52672-DDA6-47E7-ABA0-663B0511BE6F}" dt="2022-08-08T09:20:54.800" v="69" actId="20577"/>
+          <ac:spMkLst>
+            <pc:docMk/>
+            <pc:sldMk cId="2478424578" sldId="269"/>
+            <ac:spMk id="6" creationId="{07305DAA-854E-8136-6D3E-2DE9734E91FA}"/>
+          </ac:spMkLst>
+        </pc:spChg>
+      </pc:sldChg>
+    </pc:docChg>
+  </pc:docChgLst>
 </pc:chgInfo>
 </file>
 
@@ -1709,7 +1762,7 @@
             </a:r>
             <a:r>
               <a:rPr lang="en-US" baseline="0" dirty="0"/>
-              <a:t> months into the future</a:t>
+              <a:t> months into the future (SGD)</a:t>
             </a:r>
             <a:endParaRPr lang="en-SG" dirty="0"/>
           </a:p>
@@ -6482,7 +6535,15 @@
           <dgm:chPref val="0"/>
         </dgm:presLayoutVars>
       </dgm:prSet>
-      <dgm:spPr/>
+      <dgm:spPr>
+        <a:blipFill dpi="0" rotWithShape="1">
+          <a:blip xmlns:r="http://schemas.openxmlformats.org/officeDocument/2006/relationships" r:embed="rId1"/>
+          <a:srcRect/>
+          <a:stretch>
+            <a:fillRect l="11529" t="6342" r="8749" b="-30708"/>
+          </a:stretch>
+        </a:blipFill>
+      </dgm:spPr>
     </dgm:pt>
     <dgm:pt modelId="{90AF3D28-5D74-4AD3-A779-3DE62CB7B063}" type="pres">
       <dgm:prSet presAssocID="{380DA905-DCAF-4B1F-B18E-76997AF28117}" presName="ChildComposite" presStyleCnt="0"/>
@@ -6539,7 +6600,7 @@
       </dgm:prSet>
       <dgm:spPr>
         <a:blipFill dpi="0" rotWithShape="1">
-          <a:blip xmlns:r="http://schemas.openxmlformats.org/officeDocument/2006/relationships" r:embed="rId1"/>
+          <a:blip xmlns:r="http://schemas.openxmlformats.org/officeDocument/2006/relationships" r:embed="rId2"/>
           <a:srcRect/>
           <a:stretch>
             <a:fillRect t="477" b="-56477"/>
@@ -6602,7 +6663,7 @@
       </dgm:prSet>
       <dgm:spPr>
         <a:blipFill dpi="0" rotWithShape="1">
-          <a:blip xmlns:r="http://schemas.openxmlformats.org/officeDocument/2006/relationships" r:embed="rId2"/>
+          <a:blip xmlns:r="http://schemas.openxmlformats.org/officeDocument/2006/relationships" r:embed="rId3"/>
           <a:srcRect/>
           <a:stretch>
             <a:fillRect l="14171" t="478" r="16849" b="-8086"/>
@@ -6665,7 +6726,7 @@
       </dgm:prSet>
       <dgm:spPr>
         <a:blipFill dpi="0" rotWithShape="1">
-          <a:blip xmlns:r="http://schemas.openxmlformats.org/officeDocument/2006/relationships" r:embed="rId3"/>
+          <a:blip xmlns:r="http://schemas.openxmlformats.org/officeDocument/2006/relationships" r:embed="rId4"/>
           <a:srcRect/>
           <a:stretch>
             <a:fillRect l="5961" t="-2249" r="7581" b="-32627"/>
@@ -6728,7 +6789,7 @@
       </dgm:prSet>
       <dgm:spPr>
         <a:blipFill dpi="0" rotWithShape="1">
-          <a:blip xmlns:r="http://schemas.openxmlformats.org/officeDocument/2006/relationships" r:embed="rId4"/>
+          <a:blip xmlns:r="http://schemas.openxmlformats.org/officeDocument/2006/relationships" r:embed="rId5"/>
           <a:srcRect/>
           <a:stretch>
             <a:fillRect l="9965" t="-5864" r="7769" b="-20826"/>
@@ -8108,15 +8169,13 @@
         <a:prstGeom prst="rect">
           <a:avLst/>
         </a:prstGeom>
-        <a:solidFill>
-          <a:schemeClr val="accent1">
-            <a:tint val="50000"/>
-            <a:hueOff val="0"/>
-            <a:satOff val="0"/>
-            <a:lumOff val="0"/>
-            <a:alphaOff val="0"/>
-          </a:schemeClr>
-        </a:solidFill>
+        <a:blipFill dpi="0" rotWithShape="1">
+          <a:blip xmlns:r="http://schemas.openxmlformats.org/officeDocument/2006/relationships" r:embed="rId1"/>
+          <a:srcRect/>
+          <a:stretch>
+            <a:fillRect l="11529" t="6342" r="8749" b="-30708"/>
+          </a:stretch>
+        </a:blipFill>
         <a:ln w="25400" cap="flat" cmpd="sng" algn="ctr">
           <a:solidFill>
             <a:schemeClr val="lt1">
@@ -8265,7 +8324,7 @@
           <a:avLst/>
         </a:prstGeom>
         <a:blipFill dpi="0" rotWithShape="1">
-          <a:blip xmlns:r="http://schemas.openxmlformats.org/officeDocument/2006/relationships" r:embed="rId1"/>
+          <a:blip xmlns:r="http://schemas.openxmlformats.org/officeDocument/2006/relationships" r:embed="rId2"/>
           <a:srcRect/>
           <a:stretch>
             <a:fillRect t="477" b="-56477"/>
@@ -8419,7 +8478,7 @@
           <a:avLst/>
         </a:prstGeom>
         <a:blipFill dpi="0" rotWithShape="1">
-          <a:blip xmlns:r="http://schemas.openxmlformats.org/officeDocument/2006/relationships" r:embed="rId2"/>
+          <a:blip xmlns:r="http://schemas.openxmlformats.org/officeDocument/2006/relationships" r:embed="rId3"/>
           <a:srcRect/>
           <a:stretch>
             <a:fillRect l="14171" t="478" r="16849" b="-8086"/>
@@ -8573,7 +8632,7 @@
           <a:avLst/>
         </a:prstGeom>
         <a:blipFill dpi="0" rotWithShape="1">
-          <a:blip xmlns:r="http://schemas.openxmlformats.org/officeDocument/2006/relationships" r:embed="rId3"/>
+          <a:blip xmlns:r="http://schemas.openxmlformats.org/officeDocument/2006/relationships" r:embed="rId4"/>
           <a:srcRect/>
           <a:stretch>
             <a:fillRect l="5961" t="-2249" r="7581" b="-32627"/>
@@ -8728,7 +8787,7 @@
           <a:avLst/>
         </a:prstGeom>
         <a:blipFill dpi="0" rotWithShape="1">
-          <a:blip xmlns:r="http://schemas.openxmlformats.org/officeDocument/2006/relationships" r:embed="rId4"/>
+          <a:blip xmlns:r="http://schemas.openxmlformats.org/officeDocument/2006/relationships" r:embed="rId5"/>
           <a:srcRect/>
           <a:stretch>
             <a:fillRect l="9965" t="-5864" r="7769" b="-20826"/>
@@ -15965,7 +16024,7 @@
               <a:pPr>
                 <a:defRPr/>
               </a:pPr>
-              <a:t>8/6/2022</a:t>
+              <a:t>8/8/2022</a:t>
             </a:fld>
             <a:endParaRPr lang="en-GB"/>
           </a:p>
@@ -16140,7 +16199,7 @@
             <a:fld id="{50A6EDBF-7C52-4A73-9A75-5B9E14CD0B4F}" type="datetimeFigureOut">
               <a:rPr lang="en-GB" smtClean="0"/>
               <a:pPr/>
-              <a:t>06/08/2022</a:t>
+              <a:t>08/08/2022</a:t>
             </a:fld>
             <a:endParaRPr lang="en-GB"/>
           </a:p>
@@ -17981,7 +18040,7 @@
         <p:spPr>
           <a:xfrm>
             <a:off x="6228184" y="1700808"/>
-            <a:ext cx="2520280" cy="3785652"/>
+            <a:ext cx="2520280" cy="4278094"/>
           </a:xfrm>
           <a:prstGeom prst="rect">
             <a:avLst/>
@@ -18025,7 +18084,7 @@
             </a:pPr>
             <a:r>
               <a:rPr lang="en-US" dirty="0"/>
-              <a:t>Lowered cost to buy with effective development methodology</a:t>
+              <a:t>Lowered cost-to-buy with effective development methodology</a:t>
             </a:r>
           </a:p>
           <a:p>
@@ -18042,7 +18101,7 @@
             </a:pPr>
             <a:r>
               <a:rPr lang="en-SG" dirty="0"/>
-              <a:t>Available on any platforms through internet</a:t>
+              <a:t>Available on any platforms through internet, app store, pre-installed in new devices</a:t>
             </a:r>
           </a:p>
         </p:txBody>
@@ -18394,7 +18453,7 @@
             <p:ph idx="1"/>
             <p:extLst>
               <p:ext uri="{D42A27DB-BD31-4B8C-83A1-F6EECF244321}">
-                <p14:modId xmlns:p14="http://schemas.microsoft.com/office/powerpoint/2010/main" val="2955140233"/>
+                <p14:modId xmlns:p14="http://schemas.microsoft.com/office/powerpoint/2010/main" val="854106277"/>
               </p:ext>
             </p:extLst>
           </p:nvPr>
@@ -18638,7 +18697,7 @@
           <p:nvPr>
             <p:extLst>
               <p:ext uri="{D42A27DB-BD31-4B8C-83A1-F6EECF244321}">
-                <p14:modId xmlns:p14="http://schemas.microsoft.com/office/powerpoint/2010/main" val="3551955825"/>
+                <p14:modId xmlns:p14="http://schemas.microsoft.com/office/powerpoint/2010/main" val="3939507191"/>
               </p:ext>
             </p:extLst>
           </p:nvPr>

</xml_diff>

<commit_message>
Updated deck with removed names
</commit_message>
<xml_diff>
--- a/Presentation Deck/CE291 Final Product Presentation.pptx
+++ b/Presentation Deck/CE291 Final Product Presentation.pptx
@@ -189,7 +189,7 @@
 <file path=ppt/revisionInfo.xml><?xml version="1.0" encoding="utf-8"?>
 <p1510:revInfo xmlns:a="http://schemas.openxmlformats.org/drawingml/2006/main" xmlns:r="http://schemas.openxmlformats.org/officeDocument/2006/relationships" xmlns:p1510="http://schemas.microsoft.com/office/powerpoint/2015/10/main">
   <p1510:revLst>
-    <p1510:client id="{78B52672-DDA6-47E7-ABA0-663B0511BE6F}" v="71" dt="2022-08-08T09:20:54.800"/>
+    <p1510:client id="{78B52672-DDA6-47E7-ABA0-663B0511BE6F}" v="77" dt="2022-08-09T07:16:06.490"/>
   </p1510:revLst>
 </p1510:revInfo>
 </file>
@@ -1178,11 +1178,56 @@
   </pc:docChgLst>
   <pc:docChgLst>
     <pc:chgData name="Nicholas Pwi" userId="dce1f3ae2e513536" providerId="LiveId" clId="{78B52672-DDA6-47E7-ABA0-663B0511BE6F}"/>
-    <pc:docChg chg="modSld">
-      <pc:chgData name="Nicholas Pwi" userId="dce1f3ae2e513536" providerId="LiveId" clId="{78B52672-DDA6-47E7-ABA0-663B0511BE6F}" dt="2022-08-08T09:20:54.800" v="69" actId="20577"/>
+    <pc:docChg chg="custSel modSld">
+      <pc:chgData name="Nicholas Pwi" userId="dce1f3ae2e513536" providerId="LiveId" clId="{78B52672-DDA6-47E7-ABA0-663B0511BE6F}" dt="2022-08-09T08:24:48.694" v="94" actId="478"/>
       <pc:docMkLst>
         <pc:docMk/>
       </pc:docMkLst>
+      <pc:sldChg chg="delSp mod">
+        <pc:chgData name="Nicholas Pwi" userId="dce1f3ae2e513536" providerId="LiveId" clId="{78B52672-DDA6-47E7-ABA0-663B0511BE6F}" dt="2022-08-09T08:24:22.461" v="85" actId="478"/>
+        <pc:sldMkLst>
+          <pc:docMk/>
+          <pc:sldMk cId="0" sldId="257"/>
+        </pc:sldMkLst>
+        <pc:spChg chg="del">
+          <ac:chgData name="Nicholas Pwi" userId="dce1f3ae2e513536" providerId="LiveId" clId="{78B52672-DDA6-47E7-ABA0-663B0511BE6F}" dt="2022-08-09T08:24:22.461" v="85" actId="478"/>
+          <ac:spMkLst>
+            <pc:docMk/>
+            <pc:sldMk cId="0" sldId="257"/>
+            <ac:spMk id="4" creationId="{EA30CBF5-305A-4089-097C-0AA0EC28A4EB}"/>
+          </ac:spMkLst>
+        </pc:spChg>
+      </pc:sldChg>
+      <pc:sldChg chg="delSp mod">
+        <pc:chgData name="Nicholas Pwi" userId="dce1f3ae2e513536" providerId="LiveId" clId="{78B52672-DDA6-47E7-ABA0-663B0511BE6F}" dt="2022-08-09T08:24:24.369" v="86" actId="478"/>
+        <pc:sldMkLst>
+          <pc:docMk/>
+          <pc:sldMk cId="0" sldId="258"/>
+        </pc:sldMkLst>
+        <pc:spChg chg="del">
+          <ac:chgData name="Nicholas Pwi" userId="dce1f3ae2e513536" providerId="LiveId" clId="{78B52672-DDA6-47E7-ABA0-663B0511BE6F}" dt="2022-08-09T08:24:24.369" v="86" actId="478"/>
+          <ac:spMkLst>
+            <pc:docMk/>
+            <pc:sldMk cId="0" sldId="258"/>
+            <ac:spMk id="7" creationId="{4255E10E-EABC-7196-64A6-D1D8359BBF03}"/>
+          </ac:spMkLst>
+        </pc:spChg>
+      </pc:sldChg>
+      <pc:sldChg chg="delSp mod">
+        <pc:chgData name="Nicholas Pwi" userId="dce1f3ae2e513536" providerId="LiveId" clId="{78B52672-DDA6-47E7-ABA0-663B0511BE6F}" dt="2022-08-09T08:24:26.039" v="87" actId="478"/>
+        <pc:sldMkLst>
+          <pc:docMk/>
+          <pc:sldMk cId="1621381841" sldId="259"/>
+        </pc:sldMkLst>
+        <pc:spChg chg="del">
+          <ac:chgData name="Nicholas Pwi" userId="dce1f3ae2e513536" providerId="LiveId" clId="{78B52672-DDA6-47E7-ABA0-663B0511BE6F}" dt="2022-08-09T08:24:26.039" v="87" actId="478"/>
+          <ac:spMkLst>
+            <pc:docMk/>
+            <pc:sldMk cId="1621381841" sldId="259"/>
+            <ac:spMk id="4" creationId="{10188156-2195-97A2-1BD6-BA9AC971A603}"/>
+          </ac:spMkLst>
+        </pc:spChg>
+      </pc:sldChg>
       <pc:sldChg chg="modSp">
         <pc:chgData name="Nicholas Pwi" userId="dce1f3ae2e513536" providerId="LiveId" clId="{78B52672-DDA6-47E7-ABA0-663B0511BE6F}" dt="2022-08-08T08:11:04.052" v="4"/>
         <pc:sldMkLst>
@@ -1198,12 +1243,118 @@
           </ac:graphicFrameMkLst>
         </pc:graphicFrameChg>
       </pc:sldChg>
-      <pc:sldChg chg="modSp">
-        <pc:chgData name="Nicholas Pwi" userId="dce1f3ae2e513536" providerId="LiveId" clId="{78B52672-DDA6-47E7-ABA0-663B0511BE6F}" dt="2022-08-08T08:12:16.319" v="10" actId="20577"/>
+      <pc:sldChg chg="delSp mod">
+        <pc:chgData name="Nicholas Pwi" userId="dce1f3ae2e513536" providerId="LiveId" clId="{78B52672-DDA6-47E7-ABA0-663B0511BE6F}" dt="2022-08-09T08:24:30.519" v="88" actId="478"/>
+        <pc:sldMkLst>
+          <pc:docMk/>
+          <pc:sldMk cId="4281290977" sldId="261"/>
+        </pc:sldMkLst>
+        <pc:spChg chg="del">
+          <ac:chgData name="Nicholas Pwi" userId="dce1f3ae2e513536" providerId="LiveId" clId="{78B52672-DDA6-47E7-ABA0-663B0511BE6F}" dt="2022-08-09T08:24:30.519" v="88" actId="478"/>
+          <ac:spMkLst>
+            <pc:docMk/>
+            <pc:sldMk cId="4281290977" sldId="261"/>
+            <ac:spMk id="4" creationId="{716DB6EF-CC1C-3E91-665D-58FF9103A955}"/>
+          </ac:spMkLst>
+        </pc:spChg>
+      </pc:sldChg>
+      <pc:sldChg chg="delSp mod">
+        <pc:chgData name="Nicholas Pwi" userId="dce1f3ae2e513536" providerId="LiveId" clId="{78B52672-DDA6-47E7-ABA0-663B0511BE6F}" dt="2022-08-09T08:24:32.679" v="89" actId="478"/>
+        <pc:sldMkLst>
+          <pc:docMk/>
+          <pc:sldMk cId="2116644519" sldId="262"/>
+        </pc:sldMkLst>
+        <pc:spChg chg="del">
+          <ac:chgData name="Nicholas Pwi" userId="dce1f3ae2e513536" providerId="LiveId" clId="{78B52672-DDA6-47E7-ABA0-663B0511BE6F}" dt="2022-08-09T08:24:32.679" v="89" actId="478"/>
+          <ac:spMkLst>
+            <pc:docMk/>
+            <pc:sldMk cId="2116644519" sldId="262"/>
+            <ac:spMk id="5" creationId="{E361A79D-BC04-C21A-7A92-40AD7F0BB559}"/>
+          </ac:spMkLst>
+        </pc:spChg>
+      </pc:sldChg>
+      <pc:sldChg chg="delSp mod">
+        <pc:chgData name="Nicholas Pwi" userId="dce1f3ae2e513536" providerId="LiveId" clId="{78B52672-DDA6-47E7-ABA0-663B0511BE6F}" dt="2022-08-09T08:24:41.255" v="92" actId="478"/>
+        <pc:sldMkLst>
+          <pc:docMk/>
+          <pc:sldMk cId="4379521" sldId="263"/>
+        </pc:sldMkLst>
+        <pc:spChg chg="del">
+          <ac:chgData name="Nicholas Pwi" userId="dce1f3ae2e513536" providerId="LiveId" clId="{78B52672-DDA6-47E7-ABA0-663B0511BE6F}" dt="2022-08-09T08:24:41.255" v="92" actId="478"/>
+          <ac:spMkLst>
+            <pc:docMk/>
+            <pc:sldMk cId="4379521" sldId="263"/>
+            <ac:spMk id="4" creationId="{5030FC50-38ED-40A4-9E30-FDB092C14604}"/>
+          </ac:spMkLst>
+        </pc:spChg>
+      </pc:sldChg>
+      <pc:sldChg chg="delSp mod">
+        <pc:chgData name="Nicholas Pwi" userId="dce1f3ae2e513536" providerId="LiveId" clId="{78B52672-DDA6-47E7-ABA0-663B0511BE6F}" dt="2022-08-09T08:24:39.158" v="91" actId="478"/>
+        <pc:sldMkLst>
+          <pc:docMk/>
+          <pc:sldMk cId="390759158" sldId="264"/>
+        </pc:sldMkLst>
+        <pc:spChg chg="del">
+          <ac:chgData name="Nicholas Pwi" userId="dce1f3ae2e513536" providerId="LiveId" clId="{78B52672-DDA6-47E7-ABA0-663B0511BE6F}" dt="2022-08-09T08:24:39.158" v="91" actId="478"/>
+          <ac:spMkLst>
+            <pc:docMk/>
+            <pc:sldMk cId="390759158" sldId="264"/>
+            <ac:spMk id="7" creationId="{A8117894-D29B-D8CE-182A-D8C4F004616D}"/>
+          </ac:spMkLst>
+        </pc:spChg>
+      </pc:sldChg>
+      <pc:sldChg chg="delSp mod">
+        <pc:chgData name="Nicholas Pwi" userId="dce1f3ae2e513536" providerId="LiveId" clId="{78B52672-DDA6-47E7-ABA0-663B0511BE6F}" dt="2022-08-09T08:24:36.855" v="90" actId="478"/>
+        <pc:sldMkLst>
+          <pc:docMk/>
+          <pc:sldMk cId="494268009" sldId="265"/>
+        </pc:sldMkLst>
+        <pc:spChg chg="del">
+          <ac:chgData name="Nicholas Pwi" userId="dce1f3ae2e513536" providerId="LiveId" clId="{78B52672-DDA6-47E7-ABA0-663B0511BE6F}" dt="2022-08-09T08:24:36.855" v="90" actId="478"/>
+          <ac:spMkLst>
+            <pc:docMk/>
+            <pc:sldMk cId="494268009" sldId="265"/>
+            <ac:spMk id="4" creationId="{ACBDDD4C-EF45-29D3-F935-AF2D1792F02D}"/>
+          </ac:spMkLst>
+        </pc:spChg>
+      </pc:sldChg>
+      <pc:sldChg chg="delSp modSp mod">
+        <pc:chgData name="Nicholas Pwi" userId="dce1f3ae2e513536" providerId="LiveId" clId="{78B52672-DDA6-47E7-ABA0-663B0511BE6F}" dt="2022-08-09T08:24:46.151" v="93" actId="478"/>
+        <pc:sldMkLst>
+          <pc:docMk/>
+          <pc:sldMk cId="3534533839" sldId="266"/>
+        </pc:sldMkLst>
+        <pc:spChg chg="del">
+          <ac:chgData name="Nicholas Pwi" userId="dce1f3ae2e513536" providerId="LiveId" clId="{78B52672-DDA6-47E7-ABA0-663B0511BE6F}" dt="2022-08-09T08:24:46.151" v="93" actId="478"/>
+          <ac:spMkLst>
+            <pc:docMk/>
+            <pc:sldMk cId="3534533839" sldId="266"/>
+            <ac:spMk id="4" creationId="{40F078BF-EF20-C740-1852-D8DFD52CC36F}"/>
+          </ac:spMkLst>
+        </pc:spChg>
+        <pc:graphicFrameChg chg="mod">
+          <ac:chgData name="Nicholas Pwi" userId="dce1f3ae2e513536" providerId="LiveId" clId="{78B52672-DDA6-47E7-ABA0-663B0511BE6F}" dt="2022-08-09T07:16:06.490" v="75" actId="20577"/>
+          <ac:graphicFrameMkLst>
+            <pc:docMk/>
+            <pc:sldMk cId="3534533839" sldId="266"/>
+            <ac:graphicFrameMk id="7" creationId="{392AF5C1-B1F4-38B6-5811-6C2D8CDE77E9}"/>
+          </ac:graphicFrameMkLst>
+        </pc:graphicFrameChg>
+      </pc:sldChg>
+      <pc:sldChg chg="delSp modSp mod">
+        <pc:chgData name="Nicholas Pwi" userId="dce1f3ae2e513536" providerId="LiveId" clId="{78B52672-DDA6-47E7-ABA0-663B0511BE6F}" dt="2022-08-09T08:24:48.694" v="94" actId="478"/>
         <pc:sldMkLst>
           <pc:docMk/>
           <pc:sldMk cId="1421929228" sldId="267"/>
         </pc:sldMkLst>
+        <pc:spChg chg="del">
+          <ac:chgData name="Nicholas Pwi" userId="dce1f3ae2e513536" providerId="LiveId" clId="{78B52672-DDA6-47E7-ABA0-663B0511BE6F}" dt="2022-08-09T08:24:48.694" v="94" actId="478"/>
+          <ac:spMkLst>
+            <pc:docMk/>
+            <pc:sldMk cId="1421929228" sldId="267"/>
+            <ac:spMk id="4" creationId="{DF0B94A5-B26F-3505-0514-664529111959}"/>
+          </ac:spMkLst>
+        </pc:spChg>
         <pc:graphicFrameChg chg="mod">
           <ac:chgData name="Nicholas Pwi" userId="dce1f3ae2e513536" providerId="LiveId" clId="{78B52672-DDA6-47E7-ABA0-663B0511BE6F}" dt="2022-08-08T08:12:16.319" v="10" actId="20577"/>
           <ac:graphicFrameMkLst>
@@ -1268,7 +1419,7 @@
             </a:pPr>
             <a:r>
               <a:rPr lang="en-SG" dirty="0"/>
-              <a:t>Last 3 months of sales</a:t>
+              <a:t>Last 3 months of sales (SGD)</a:t>
             </a:r>
           </a:p>
         </c:rich>
@@ -1881,10 +2032,10 @@
                 <c:formatCode>General</c:formatCode>
                 <c:ptCount val="12"/>
                 <c:pt idx="0">
-                  <c:v>30000</c:v>
+                  <c:v>20000</c:v>
                 </c:pt>
                 <c:pt idx="1">
-                  <c:v>10000</c:v>
+                  <c:v>15000</c:v>
                 </c:pt>
                 <c:pt idx="2">
                   <c:v>10000</c:v>
@@ -1995,7 +2146,7 @@
                   <c:v>10000</c:v>
                 </c:pt>
                 <c:pt idx="6">
-                  <c:v>3000</c:v>
+                  <c:v>10000</c:v>
                 </c:pt>
                 <c:pt idx="7">
                   <c:v>3000</c:v>
@@ -2004,13 +2155,13 @@
                   <c:v>3000</c:v>
                 </c:pt>
                 <c:pt idx="9">
-                  <c:v>3000</c:v>
+                  <c:v>10000</c:v>
                 </c:pt>
                 <c:pt idx="10">
-                  <c:v>3000</c:v>
+                  <c:v>10000</c:v>
                 </c:pt>
                 <c:pt idx="11">
-                  <c:v>3000</c:v>
+                  <c:v>10000</c:v>
                 </c:pt>
               </c:numCache>
             </c:numRef>
@@ -16024,7 +16175,7 @@
               <a:pPr>
                 <a:defRPr/>
               </a:pPr>
-              <a:t>8/8/2022</a:t>
+              <a:t>8/9/2022</a:t>
             </a:fld>
             <a:endParaRPr lang="en-GB"/>
           </a:p>
@@ -16199,7 +16350,7 @@
             <a:fld id="{50A6EDBF-7C52-4A73-9A75-5B9E14CD0B4F}" type="datetimeFigureOut">
               <a:rPr lang="en-GB" smtClean="0"/>
               <a:pPr/>
-              <a:t>08/08/2022</a:t>
+              <a:t>09/08/2022</a:t>
             </a:fld>
             <a:endParaRPr lang="en-GB"/>
           </a:p>
@@ -17797,56 +17948,6 @@
           </a:p>
         </p:txBody>
       </p:sp>
-      <p:sp>
-        <p:nvSpPr>
-          <p:cNvPr id="4" name="Rectangle: Rounded Corners 3">
-            <a:extLst>
-              <a:ext uri="{FF2B5EF4-FFF2-40B4-BE49-F238E27FC236}">
-                <a16:creationId xmlns:a16="http://schemas.microsoft.com/office/drawing/2014/main" id="{EA30CBF5-305A-4089-097C-0AA0EC28A4EB}"/>
-              </a:ext>
-            </a:extLst>
-          </p:cNvPr>
-          <p:cNvSpPr/>
-          <p:nvPr/>
-        </p:nvSpPr>
-        <p:spPr>
-          <a:xfrm>
-            <a:off x="6948264" y="5596791"/>
-            <a:ext cx="2016224" cy="1008112"/>
-          </a:xfrm>
-          <a:prstGeom prst="roundRect">
-            <a:avLst/>
-          </a:prstGeom>
-        </p:spPr>
-        <p:style>
-          <a:lnRef idx="2">
-            <a:schemeClr val="accent1">
-              <a:shade val="50000"/>
-            </a:schemeClr>
-          </a:lnRef>
-          <a:fillRef idx="1">
-            <a:schemeClr val="accent1"/>
-          </a:fillRef>
-          <a:effectRef idx="0">
-            <a:schemeClr val="accent1"/>
-          </a:effectRef>
-          <a:fontRef idx="minor">
-            <a:schemeClr val="lt1"/>
-          </a:fontRef>
-        </p:style>
-        <p:txBody>
-          <a:bodyPr rtlCol="0" anchor="ctr"/>
-          <a:lstStyle/>
-          <a:p>
-            <a:pPr algn="ctr"/>
-            <a:r>
-              <a:rPr lang="en-US" dirty="0"/>
-              <a:t>Nicholas</a:t>
-            </a:r>
-            <a:endParaRPr lang="en-SG" dirty="0"/>
-          </a:p>
-        </p:txBody>
-      </p:sp>
     </p:spTree>
   </p:cSld>
   <p:clrMapOvr>
@@ -18313,7 +18414,7 @@
             <p:ph idx="1"/>
             <p:extLst>
               <p:ext uri="{D42A27DB-BD31-4B8C-83A1-F6EECF244321}">
-                <p14:modId xmlns:p14="http://schemas.microsoft.com/office/powerpoint/2010/main" val="481757566"/>
+                <p14:modId xmlns:p14="http://schemas.microsoft.com/office/powerpoint/2010/main" val="679047935"/>
               </p:ext>
             </p:extLst>
           </p:nvPr>
@@ -18328,56 +18429,6 @@
           </a:graphicData>
         </a:graphic>
       </p:graphicFrame>
-      <p:sp>
-        <p:nvSpPr>
-          <p:cNvPr id="4" name="Rectangle: Rounded Corners 3">
-            <a:extLst>
-              <a:ext uri="{FF2B5EF4-FFF2-40B4-BE49-F238E27FC236}">
-                <a16:creationId xmlns:a16="http://schemas.microsoft.com/office/drawing/2014/main" id="{40F078BF-EF20-C740-1852-D8DFD52CC36F}"/>
-              </a:ext>
-            </a:extLst>
-          </p:cNvPr>
-          <p:cNvSpPr/>
-          <p:nvPr/>
-        </p:nvSpPr>
-        <p:spPr>
-          <a:xfrm>
-            <a:off x="6876256" y="1556792"/>
-            <a:ext cx="2016224" cy="1008112"/>
-          </a:xfrm>
-          <a:prstGeom prst="roundRect">
-            <a:avLst/>
-          </a:prstGeom>
-        </p:spPr>
-        <p:style>
-          <a:lnRef idx="2">
-            <a:schemeClr val="accent1">
-              <a:shade val="50000"/>
-            </a:schemeClr>
-          </a:lnRef>
-          <a:fillRef idx="1">
-            <a:schemeClr val="accent1"/>
-          </a:fillRef>
-          <a:effectRef idx="0">
-            <a:schemeClr val="accent1"/>
-          </a:effectRef>
-          <a:fontRef idx="minor">
-            <a:schemeClr val="lt1"/>
-          </a:fontRef>
-        </p:style>
-        <p:txBody>
-          <a:bodyPr rtlCol="0" anchor="ctr"/>
-          <a:lstStyle/>
-          <a:p>
-            <a:pPr algn="ctr"/>
-            <a:r>
-              <a:rPr lang="en-US" dirty="0"/>
-              <a:t>Nicholas</a:t>
-            </a:r>
-            <a:endParaRPr lang="en-SG" dirty="0"/>
-          </a:p>
-        </p:txBody>
-      </p:sp>
     </p:spTree>
     <p:extLst>
       <p:ext uri="{BB962C8B-B14F-4D97-AF65-F5344CB8AC3E}">
@@ -18453,7 +18504,7 @@
             <p:ph idx="1"/>
             <p:extLst>
               <p:ext uri="{D42A27DB-BD31-4B8C-83A1-F6EECF244321}">
-                <p14:modId xmlns:p14="http://schemas.microsoft.com/office/powerpoint/2010/main" val="854106277"/>
+                <p14:modId xmlns:p14="http://schemas.microsoft.com/office/powerpoint/2010/main" val="3081419456"/>
               </p:ext>
             </p:extLst>
           </p:nvPr>
@@ -18468,56 +18519,6 @@
           </a:graphicData>
         </a:graphic>
       </p:graphicFrame>
-      <p:sp>
-        <p:nvSpPr>
-          <p:cNvPr id="4" name="Rectangle: Rounded Corners 3">
-            <a:extLst>
-              <a:ext uri="{FF2B5EF4-FFF2-40B4-BE49-F238E27FC236}">
-                <a16:creationId xmlns:a16="http://schemas.microsoft.com/office/drawing/2014/main" id="{DF0B94A5-B26F-3505-0514-664529111959}"/>
-              </a:ext>
-            </a:extLst>
-          </p:cNvPr>
-          <p:cNvSpPr/>
-          <p:nvPr/>
-        </p:nvSpPr>
-        <p:spPr>
-          <a:xfrm>
-            <a:off x="6804248" y="2996952"/>
-            <a:ext cx="2016224" cy="1008112"/>
-          </a:xfrm>
-          <a:prstGeom prst="roundRect">
-            <a:avLst/>
-          </a:prstGeom>
-        </p:spPr>
-        <p:style>
-          <a:lnRef idx="2">
-            <a:schemeClr val="accent1">
-              <a:shade val="50000"/>
-            </a:schemeClr>
-          </a:lnRef>
-          <a:fillRef idx="1">
-            <a:schemeClr val="accent1"/>
-          </a:fillRef>
-          <a:effectRef idx="0">
-            <a:schemeClr val="accent1"/>
-          </a:effectRef>
-          <a:fontRef idx="minor">
-            <a:schemeClr val="lt1"/>
-          </a:fontRef>
-        </p:style>
-        <p:txBody>
-          <a:bodyPr rtlCol="0" anchor="ctr"/>
-          <a:lstStyle/>
-          <a:p>
-            <a:pPr algn="ctr"/>
-            <a:r>
-              <a:rPr lang="en-US" dirty="0"/>
-              <a:t>Nicholas</a:t>
-            </a:r>
-            <a:endParaRPr lang="en-SG" dirty="0"/>
-          </a:p>
-        </p:txBody>
-      </p:sp>
     </p:spTree>
     <p:extLst>
       <p:ext uri="{BB962C8B-B14F-4D97-AF65-F5344CB8AC3E}">
@@ -18818,56 +18819,6 @@
           </a:graphicData>
         </a:graphic>
       </p:graphicFrame>
-      <p:sp>
-        <p:nvSpPr>
-          <p:cNvPr id="7" name="Rectangle: Rounded Corners 6">
-            <a:extLst>
-              <a:ext uri="{FF2B5EF4-FFF2-40B4-BE49-F238E27FC236}">
-                <a16:creationId xmlns:a16="http://schemas.microsoft.com/office/drawing/2014/main" id="{4255E10E-EABC-7196-64A6-D1D8359BBF03}"/>
-              </a:ext>
-            </a:extLst>
-          </p:cNvPr>
-          <p:cNvSpPr/>
-          <p:nvPr/>
-        </p:nvSpPr>
-        <p:spPr>
-          <a:xfrm>
-            <a:off x="6960506" y="5661248"/>
-            <a:ext cx="2016224" cy="1008112"/>
-          </a:xfrm>
-          <a:prstGeom prst="roundRect">
-            <a:avLst/>
-          </a:prstGeom>
-        </p:spPr>
-        <p:style>
-          <a:lnRef idx="2">
-            <a:schemeClr val="accent1">
-              <a:shade val="50000"/>
-            </a:schemeClr>
-          </a:lnRef>
-          <a:fillRef idx="1">
-            <a:schemeClr val="accent1"/>
-          </a:fillRef>
-          <a:effectRef idx="0">
-            <a:schemeClr val="accent1"/>
-          </a:effectRef>
-          <a:fontRef idx="minor">
-            <a:schemeClr val="lt1"/>
-          </a:fontRef>
-        </p:style>
-        <p:txBody>
-          <a:bodyPr rtlCol="0" anchor="ctr"/>
-          <a:lstStyle/>
-          <a:p>
-            <a:pPr algn="ctr"/>
-            <a:r>
-              <a:rPr lang="en-US" dirty="0"/>
-              <a:t>Wilson</a:t>
-            </a:r>
-            <a:endParaRPr lang="en-SG" dirty="0"/>
-          </a:p>
-        </p:txBody>
-      </p:sp>
     </p:spTree>
   </p:cSld>
   <p:clrMapOvr>
@@ -18917,56 +18868,6 @@
             <a:r>
               <a:rPr lang="en-US" dirty="0"/>
               <a:t>Problem Statement</a:t>
-            </a:r>
-            <a:endParaRPr lang="en-SG" dirty="0"/>
-          </a:p>
-        </p:txBody>
-      </p:sp>
-      <p:sp>
-        <p:nvSpPr>
-          <p:cNvPr id="4" name="Rectangle: Rounded Corners 3">
-            <a:extLst>
-              <a:ext uri="{FF2B5EF4-FFF2-40B4-BE49-F238E27FC236}">
-                <a16:creationId xmlns:a16="http://schemas.microsoft.com/office/drawing/2014/main" id="{10188156-2195-97A2-1BD6-BA9AC971A603}"/>
-              </a:ext>
-            </a:extLst>
-          </p:cNvPr>
-          <p:cNvSpPr/>
-          <p:nvPr/>
-        </p:nvSpPr>
-        <p:spPr>
-          <a:xfrm>
-            <a:off x="6948264" y="5661248"/>
-            <a:ext cx="2016224" cy="1008112"/>
-          </a:xfrm>
-          <a:prstGeom prst="roundRect">
-            <a:avLst/>
-          </a:prstGeom>
-        </p:spPr>
-        <p:style>
-          <a:lnRef idx="2">
-            <a:schemeClr val="accent1">
-              <a:shade val="50000"/>
-            </a:schemeClr>
-          </a:lnRef>
-          <a:fillRef idx="1">
-            <a:schemeClr val="accent1"/>
-          </a:fillRef>
-          <a:effectRef idx="0">
-            <a:schemeClr val="accent1"/>
-          </a:effectRef>
-          <a:fontRef idx="minor">
-            <a:schemeClr val="lt1"/>
-          </a:fontRef>
-        </p:style>
-        <p:txBody>
-          <a:bodyPr rtlCol="0" anchor="ctr"/>
-          <a:lstStyle/>
-          <a:p>
-            <a:pPr algn="ctr"/>
-            <a:r>
-              <a:rPr lang="en-US" dirty="0"/>
-              <a:t>Wilson</a:t>
             </a:r>
             <a:endParaRPr lang="en-SG" dirty="0"/>
           </a:p>
@@ -19120,56 +19021,6 @@
           </a:p>
         </p:txBody>
       </p:sp>
-      <p:sp>
-        <p:nvSpPr>
-          <p:cNvPr id="4" name="Rectangle: Rounded Corners 3">
-            <a:extLst>
-              <a:ext uri="{FF2B5EF4-FFF2-40B4-BE49-F238E27FC236}">
-                <a16:creationId xmlns:a16="http://schemas.microsoft.com/office/drawing/2014/main" id="{716DB6EF-CC1C-3E91-665D-58FF9103A955}"/>
-              </a:ext>
-            </a:extLst>
-          </p:cNvPr>
-          <p:cNvSpPr/>
-          <p:nvPr/>
-        </p:nvSpPr>
-        <p:spPr>
-          <a:xfrm>
-            <a:off x="6948264" y="5589240"/>
-            <a:ext cx="2016224" cy="1008112"/>
-          </a:xfrm>
-          <a:prstGeom prst="roundRect">
-            <a:avLst/>
-          </a:prstGeom>
-        </p:spPr>
-        <p:style>
-          <a:lnRef idx="2">
-            <a:schemeClr val="accent1">
-              <a:shade val="50000"/>
-            </a:schemeClr>
-          </a:lnRef>
-          <a:fillRef idx="1">
-            <a:schemeClr val="accent1"/>
-          </a:fillRef>
-          <a:effectRef idx="0">
-            <a:schemeClr val="accent1"/>
-          </a:effectRef>
-          <a:fontRef idx="minor">
-            <a:schemeClr val="lt1"/>
-          </a:fontRef>
-        </p:style>
-        <p:txBody>
-          <a:bodyPr rtlCol="0" anchor="ctr"/>
-          <a:lstStyle/>
-          <a:p>
-            <a:pPr algn="ctr"/>
-            <a:r>
-              <a:rPr lang="en-US" dirty="0"/>
-              <a:t>Li Zhen</a:t>
-            </a:r>
-            <a:endParaRPr lang="en-SG" dirty="0"/>
-          </a:p>
-        </p:txBody>
-      </p:sp>
       <p:graphicFrame>
         <p:nvGraphicFramePr>
           <p:cNvPr id="13" name="Content Placeholder 12">
@@ -19255,56 +19106,6 @@
             <a:r>
               <a:rPr lang="en-US" dirty="0"/>
               <a:t>Our Product – Main Menu Feature</a:t>
-            </a:r>
-            <a:endParaRPr lang="en-SG" dirty="0"/>
-          </a:p>
-        </p:txBody>
-      </p:sp>
-      <p:sp>
-        <p:nvSpPr>
-          <p:cNvPr id="5" name="Rectangle: Rounded Corners 4">
-            <a:extLst>
-              <a:ext uri="{FF2B5EF4-FFF2-40B4-BE49-F238E27FC236}">
-                <a16:creationId xmlns:a16="http://schemas.microsoft.com/office/drawing/2014/main" id="{E361A79D-BC04-C21A-7A92-40AD7F0BB559}"/>
-              </a:ext>
-            </a:extLst>
-          </p:cNvPr>
-          <p:cNvSpPr/>
-          <p:nvPr/>
-        </p:nvSpPr>
-        <p:spPr>
-          <a:xfrm>
-            <a:off x="6876256" y="5589240"/>
-            <a:ext cx="2016224" cy="1008112"/>
-          </a:xfrm>
-          <a:prstGeom prst="roundRect">
-            <a:avLst/>
-          </a:prstGeom>
-        </p:spPr>
-        <p:style>
-          <a:lnRef idx="2">
-            <a:schemeClr val="accent1">
-              <a:shade val="50000"/>
-            </a:schemeClr>
-          </a:lnRef>
-          <a:fillRef idx="1">
-            <a:schemeClr val="accent1"/>
-          </a:fillRef>
-          <a:effectRef idx="0">
-            <a:schemeClr val="accent1"/>
-          </a:effectRef>
-          <a:fontRef idx="minor">
-            <a:schemeClr val="lt1"/>
-          </a:fontRef>
-        </p:style>
-        <p:txBody>
-          <a:bodyPr rtlCol="0" anchor="ctr"/>
-          <a:lstStyle/>
-          <a:p>
-            <a:pPr algn="ctr"/>
-            <a:r>
-              <a:rPr lang="en-US" dirty="0"/>
-              <a:t>CK</a:t>
             </a:r>
             <a:endParaRPr lang="en-SG" dirty="0"/>
           </a:p>
@@ -20006,56 +19807,6 @@
       </p:pic>
       <p:sp>
         <p:nvSpPr>
-          <p:cNvPr id="4" name="Rectangle: Rounded Corners 3">
-            <a:extLst>
-              <a:ext uri="{FF2B5EF4-FFF2-40B4-BE49-F238E27FC236}">
-                <a16:creationId xmlns:a16="http://schemas.microsoft.com/office/drawing/2014/main" id="{ACBDDD4C-EF45-29D3-F935-AF2D1792F02D}"/>
-              </a:ext>
-            </a:extLst>
-          </p:cNvPr>
-          <p:cNvSpPr/>
-          <p:nvPr/>
-        </p:nvSpPr>
-        <p:spPr>
-          <a:xfrm>
-            <a:off x="6948264" y="5673629"/>
-            <a:ext cx="2016224" cy="1008112"/>
-          </a:xfrm>
-          <a:prstGeom prst="roundRect">
-            <a:avLst/>
-          </a:prstGeom>
-        </p:spPr>
-        <p:style>
-          <a:lnRef idx="2">
-            <a:schemeClr val="accent1">
-              <a:shade val="50000"/>
-            </a:schemeClr>
-          </a:lnRef>
-          <a:fillRef idx="1">
-            <a:schemeClr val="accent1"/>
-          </a:fillRef>
-          <a:effectRef idx="0">
-            <a:schemeClr val="accent1"/>
-          </a:effectRef>
-          <a:fontRef idx="minor">
-            <a:schemeClr val="lt1"/>
-          </a:fontRef>
-        </p:style>
-        <p:txBody>
-          <a:bodyPr rtlCol="0" anchor="ctr"/>
-          <a:lstStyle/>
-          <a:p>
-            <a:pPr algn="ctr"/>
-            <a:r>
-              <a:rPr lang="en-US" dirty="0"/>
-              <a:t>CK</a:t>
-            </a:r>
-            <a:endParaRPr lang="en-SG" dirty="0"/>
-          </a:p>
-        </p:txBody>
-      </p:sp>
-      <p:sp>
-        <p:nvSpPr>
           <p:cNvPr id="10" name="Rectangle: Rounded Corners 9">
             <a:extLst>
               <a:ext uri="{FF2B5EF4-FFF2-40B4-BE49-F238E27FC236}">
@@ -20711,56 +20462,6 @@
           </a:effectLst>
         </p:spPr>
       </p:pic>
-      <p:sp>
-        <p:nvSpPr>
-          <p:cNvPr id="4" name="Rectangle: Rounded Corners 3">
-            <a:extLst>
-              <a:ext uri="{FF2B5EF4-FFF2-40B4-BE49-F238E27FC236}">
-                <a16:creationId xmlns:a16="http://schemas.microsoft.com/office/drawing/2014/main" id="{5030FC50-38ED-40A4-9E30-FDB092C14604}"/>
-              </a:ext>
-            </a:extLst>
-          </p:cNvPr>
-          <p:cNvSpPr/>
-          <p:nvPr/>
-        </p:nvSpPr>
-        <p:spPr>
-          <a:xfrm>
-            <a:off x="245713" y="5589240"/>
-            <a:ext cx="2016224" cy="1008112"/>
-          </a:xfrm>
-          <a:prstGeom prst="roundRect">
-            <a:avLst/>
-          </a:prstGeom>
-        </p:spPr>
-        <p:style>
-          <a:lnRef idx="2">
-            <a:schemeClr val="accent1">
-              <a:shade val="50000"/>
-            </a:schemeClr>
-          </a:lnRef>
-          <a:fillRef idx="1">
-            <a:schemeClr val="accent1"/>
-          </a:fillRef>
-          <a:effectRef idx="0">
-            <a:schemeClr val="accent1"/>
-          </a:effectRef>
-          <a:fontRef idx="minor">
-            <a:schemeClr val="lt1"/>
-          </a:fontRef>
-        </p:style>
-        <p:txBody>
-          <a:bodyPr rtlCol="0" anchor="ctr"/>
-          <a:lstStyle/>
-          <a:p>
-            <a:pPr algn="ctr"/>
-            <a:r>
-              <a:rPr lang="en-US" dirty="0"/>
-              <a:t>Jason</a:t>
-            </a:r>
-            <a:endParaRPr lang="en-SG" dirty="0"/>
-          </a:p>
-        </p:txBody>
-      </p:sp>
       <p:pic>
         <p:nvPicPr>
           <p:cNvPr id="8" name="Picture 7">
@@ -21310,56 +21011,6 @@
             <a:r>
               <a:rPr lang="en-US" dirty="0"/>
               <a:t>Our Product – Solver Feature</a:t>
-            </a:r>
-            <a:endParaRPr lang="en-SG" dirty="0"/>
-          </a:p>
-        </p:txBody>
-      </p:sp>
-      <p:sp>
-        <p:nvSpPr>
-          <p:cNvPr id="7" name="Rectangle: Rounded Corners 6">
-            <a:extLst>
-              <a:ext uri="{FF2B5EF4-FFF2-40B4-BE49-F238E27FC236}">
-                <a16:creationId xmlns:a16="http://schemas.microsoft.com/office/drawing/2014/main" id="{A8117894-D29B-D8CE-182A-D8C4F004616D}"/>
-              </a:ext>
-            </a:extLst>
-          </p:cNvPr>
-          <p:cNvSpPr/>
-          <p:nvPr/>
-        </p:nvSpPr>
-        <p:spPr>
-          <a:xfrm>
-            <a:off x="5292080" y="6121618"/>
-            <a:ext cx="1152128" cy="576064"/>
-          </a:xfrm>
-          <a:prstGeom prst="roundRect">
-            <a:avLst/>
-          </a:prstGeom>
-        </p:spPr>
-        <p:style>
-          <a:lnRef idx="2">
-            <a:schemeClr val="accent1">
-              <a:shade val="50000"/>
-            </a:schemeClr>
-          </a:lnRef>
-          <a:fillRef idx="1">
-            <a:schemeClr val="accent1"/>
-          </a:fillRef>
-          <a:effectRef idx="0">
-            <a:schemeClr val="accent1"/>
-          </a:effectRef>
-          <a:fontRef idx="minor">
-            <a:schemeClr val="lt1"/>
-          </a:fontRef>
-        </p:style>
-        <p:txBody>
-          <a:bodyPr rtlCol="0" anchor="ctr"/>
-          <a:lstStyle/>
-          <a:p>
-            <a:pPr algn="ctr"/>
-            <a:r>
-              <a:rPr lang="en-US" dirty="0"/>
-              <a:t>Jason</a:t>
             </a:r>
             <a:endParaRPr lang="en-SG" dirty="0"/>
           </a:p>

</xml_diff>